<commit_message>
Fix ch7 && complete code intro of ch5
</commit_message>
<xml_diff>
--- a/source/chapter7/ch7.pptx
+++ b/source/chapter7/ch7.pptx
@@ -259,7 +259,7 @@
           <a:p>
             <a:fld id="{790EBB51-64B0-4A44-A31D-11A251488376}" type="datetimeFigureOut">
               <a:rPr lang="zh-CN" altLang="en-US" smtClean="0"/>
-              <a:t>2021/3/6</a:t>
+              <a:t>2021/3/30</a:t>
             </a:fld>
             <a:endParaRPr lang="zh-CN" altLang="en-US"/>
           </a:p>
@@ -457,7 +457,7 @@
           <a:p>
             <a:fld id="{790EBB51-64B0-4A44-A31D-11A251488376}" type="datetimeFigureOut">
               <a:rPr lang="zh-CN" altLang="en-US" smtClean="0"/>
-              <a:t>2021/3/6</a:t>
+              <a:t>2021/3/30</a:t>
             </a:fld>
             <a:endParaRPr lang="zh-CN" altLang="en-US"/>
           </a:p>
@@ -665,7 +665,7 @@
           <a:p>
             <a:fld id="{790EBB51-64B0-4A44-A31D-11A251488376}" type="datetimeFigureOut">
               <a:rPr lang="zh-CN" altLang="en-US" smtClean="0"/>
-              <a:t>2021/3/6</a:t>
+              <a:t>2021/3/30</a:t>
             </a:fld>
             <a:endParaRPr lang="zh-CN" altLang="en-US"/>
           </a:p>
@@ -863,7 +863,7 @@
           <a:p>
             <a:fld id="{790EBB51-64B0-4A44-A31D-11A251488376}" type="datetimeFigureOut">
               <a:rPr lang="zh-CN" altLang="en-US" smtClean="0"/>
-              <a:t>2021/3/6</a:t>
+              <a:t>2021/3/30</a:t>
             </a:fld>
             <a:endParaRPr lang="zh-CN" altLang="en-US"/>
           </a:p>
@@ -1138,7 +1138,7 @@
           <a:p>
             <a:fld id="{790EBB51-64B0-4A44-A31D-11A251488376}" type="datetimeFigureOut">
               <a:rPr lang="zh-CN" altLang="en-US" smtClean="0"/>
-              <a:t>2021/3/6</a:t>
+              <a:t>2021/3/30</a:t>
             </a:fld>
             <a:endParaRPr lang="zh-CN" altLang="en-US"/>
           </a:p>
@@ -1403,7 +1403,7 @@
           <a:p>
             <a:fld id="{790EBB51-64B0-4A44-A31D-11A251488376}" type="datetimeFigureOut">
               <a:rPr lang="zh-CN" altLang="en-US" smtClean="0"/>
-              <a:t>2021/3/6</a:t>
+              <a:t>2021/3/30</a:t>
             </a:fld>
             <a:endParaRPr lang="zh-CN" altLang="en-US"/>
           </a:p>
@@ -1815,7 +1815,7 @@
           <a:p>
             <a:fld id="{790EBB51-64B0-4A44-A31D-11A251488376}" type="datetimeFigureOut">
               <a:rPr lang="zh-CN" altLang="en-US" smtClean="0"/>
-              <a:t>2021/3/6</a:t>
+              <a:t>2021/3/30</a:t>
             </a:fld>
             <a:endParaRPr lang="zh-CN" altLang="en-US"/>
           </a:p>
@@ -1956,7 +1956,7 @@
           <a:p>
             <a:fld id="{790EBB51-64B0-4A44-A31D-11A251488376}" type="datetimeFigureOut">
               <a:rPr lang="zh-CN" altLang="en-US" smtClean="0"/>
-              <a:t>2021/3/6</a:t>
+              <a:t>2021/3/30</a:t>
             </a:fld>
             <a:endParaRPr lang="zh-CN" altLang="en-US"/>
           </a:p>
@@ -2069,7 +2069,7 @@
           <a:p>
             <a:fld id="{790EBB51-64B0-4A44-A31D-11A251488376}" type="datetimeFigureOut">
               <a:rPr lang="zh-CN" altLang="en-US" smtClean="0"/>
-              <a:t>2021/3/6</a:t>
+              <a:t>2021/3/30</a:t>
             </a:fld>
             <a:endParaRPr lang="zh-CN" altLang="en-US"/>
           </a:p>
@@ -2380,7 +2380,7 @@
           <a:p>
             <a:fld id="{790EBB51-64B0-4A44-A31D-11A251488376}" type="datetimeFigureOut">
               <a:rPr lang="zh-CN" altLang="en-US" smtClean="0"/>
-              <a:t>2021/3/6</a:t>
+              <a:t>2021/3/30</a:t>
             </a:fld>
             <a:endParaRPr lang="zh-CN" altLang="en-US"/>
           </a:p>
@@ -2668,7 +2668,7 @@
           <a:p>
             <a:fld id="{790EBB51-64B0-4A44-A31D-11A251488376}" type="datetimeFigureOut">
               <a:rPr lang="zh-CN" altLang="en-US" smtClean="0"/>
-              <a:t>2021/3/6</a:t>
+              <a:t>2021/3/30</a:t>
             </a:fld>
             <a:endParaRPr lang="zh-CN" altLang="en-US"/>
           </a:p>
@@ -2909,7 +2909,7 @@
           <a:p>
             <a:fld id="{790EBB51-64B0-4A44-A31D-11A251488376}" type="datetimeFigureOut">
               <a:rPr lang="zh-CN" altLang="en-US" smtClean="0"/>
-              <a:t>2021/3/6</a:t>
+              <a:t>2021/3/30</a:t>
             </a:fld>
             <a:endParaRPr lang="zh-CN" altLang="en-US"/>
           </a:p>
@@ -4860,8 +4860,8 @@
           </a:p>
         </p:txBody>
       </p:sp>
-      <mc:AlternateContent xmlns:mc="http://schemas.openxmlformats.org/markup-compatibility/2006" xmlns:a14="http://schemas.microsoft.com/office/drawing/2010/main">
-        <mc:Choice Requires="a14">
+      <mc:AlternateContent xmlns:mc="http://schemas.openxmlformats.org/markup-compatibility/2006">
+        <mc:Choice xmlns:a14="http://schemas.microsoft.com/office/drawing/2010/main" Requires="a14">
           <p:sp>
             <p:nvSpPr>
               <p:cNvPr id="28" name="文本框 27">
@@ -4901,10 +4901,10 @@
                         <m:rPr>
                           <m:nor/>
                         </m:rPr>
-                        <a:rPr lang="en-US" altLang="zh-CN" b="0" i="0" smtClean="0">
+                        <a:rPr lang="en-US" altLang="zh-CN">
                           <a:latin typeface="Cambria Math" panose="02040503050406030204" pitchFamily="18" charset="0"/>
                         </a:rPr>
-                        <m:t>4</m:t>
+                        <m:t>8</m:t>
                       </m:r>
                       <m:r>
                         <m:rPr>
@@ -4923,7 +4923,7 @@
             </p:txBody>
           </p:sp>
         </mc:Choice>
-        <mc:Fallback xmlns="">
+        <mc:Fallback>
           <p:sp>
             <p:nvSpPr>
               <p:cNvPr id="28" name="文本框 27">
@@ -5012,8 +5012,8 @@
           </a:p>
         </p:txBody>
       </p:sp>
-      <mc:AlternateContent xmlns:mc="http://schemas.openxmlformats.org/markup-compatibility/2006">
-        <mc:Choice xmlns:a14="http://schemas.microsoft.com/office/drawing/2010/main" Requires="a14">
+      <mc:AlternateContent xmlns:mc="http://schemas.openxmlformats.org/markup-compatibility/2006" xmlns:a14="http://schemas.microsoft.com/office/drawing/2010/main">
+        <mc:Choice Requires="a14">
           <p:sp>
             <p:nvSpPr>
               <p:cNvPr id="30" name="文本框 29">
@@ -5075,7 +5075,7 @@
             </p:txBody>
           </p:sp>
         </mc:Choice>
-        <mc:Fallback>
+        <mc:Fallback xmlns="">
           <p:sp>
             <p:nvSpPr>
               <p:cNvPr id="30" name="文本框 29">

</xml_diff>